<commit_message>
Update DCO code, references and project files
</commit_message>
<xml_diff>
--- a/trabalho-pll.pptx
+++ b/trabalho-pll.pptx
@@ -48,11 +48,6 @@
     <p:sldId id="293" r:id="rId45"/>
     <p:sldId id="294" r:id="rId46"/>
     <p:sldId id="295" r:id="rId47"/>
-    <p:sldId id="296" r:id="rId48"/>
-    <p:sldId id="297" r:id="rId49"/>
-    <p:sldId id="298" r:id="rId50"/>
-    <p:sldId id="299" r:id="rId51"/>
-    <p:sldId id="300" r:id="rId52"/>
   </p:sldIdLst>
   <p:sldSz cx="13004800" cy="9753600"/>
   <p:notesSz cx="6858000" cy="9144000"/>
@@ -3937,8 +3932,8 @@
         </p:nvGrpSpPr>
         <p:grpSpPr>
           <a:xfrm>
-            <a:off x="7353299" y="4771396"/>
-            <a:ext cx="5334001" cy="2537058"/>
+            <a:off x="7353300" y="4771396"/>
+            <a:ext cx="5334000" cy="2537058"/>
             <a:chOff x="0" y="402844"/>
             <a:chExt cx="5334000" cy="2537056"/>
           </a:xfrm>
@@ -4326,7 +4321,7 @@
           <a:p>
             <a:pPr/>
             <a:r>
-              <a:t>O artigo [ 4] exemplifica este caso</a:t>
+              <a:t>O artigo [4] exemplifica este caso</a:t>
             </a:r>
           </a:p>
         </p:txBody>
@@ -4553,7 +4548,7 @@
               <a:defRPr sz="2528"/>
             </a:pPr>
             <a:r>
-              <a:t>Carry é colocado na entrada de INCR e Borrow em DECR (em [3] os sinais foram trocados, conforme pode ser visto em [2], [4] e [7]</a:t>
+              <a:t>Carry é colocado na entrada de DECR e Borrow em INCR (em [3] os sinais foram trocados, conforme pode ser visto em [2], [4] e [7])</a:t>
             </a:r>
           </a:p>
           <a:p>
@@ -5451,8 +5446,8 @@
         </p:nvGrpSpPr>
         <p:grpSpPr>
           <a:xfrm>
-            <a:off x="7429499" y="4813212"/>
-            <a:ext cx="5334001" cy="4801494"/>
+            <a:off x="7429500" y="4813212"/>
+            <a:ext cx="5334000" cy="4801494"/>
             <a:chOff x="0" y="0"/>
             <a:chExt cx="5334000" cy="4801492"/>
           </a:xfrm>
@@ -7310,8 +7305,8 @@
         </p:nvGrpSpPr>
         <p:grpSpPr>
           <a:xfrm>
-            <a:off x="1041399" y="2520546"/>
-            <a:ext cx="10613679" cy="6855503"/>
+            <a:off x="1041400" y="2520546"/>
+            <a:ext cx="10613678" cy="6855503"/>
             <a:chOff x="0" y="38589"/>
             <a:chExt cx="10613677" cy="6855501"/>
           </a:xfrm>
@@ -8538,7 +8533,7 @@
       </p:grpSpPr>
       <p:sp>
         <p:nvSpPr>
-          <p:cNvPr id="325" name="Referências"/>
+          <p:cNvPr id="325" name="Estrutura dos componentes em VHDL: DCO"/>
           <p:cNvSpPr txBox="1"/>
           <p:nvPr>
             <p:ph type="title"/>
@@ -8551,131 +8546,109 @@
         </p:spPr>
         <p:txBody>
           <a:bodyPr/>
-          <a:lstStyle/>
-          <a:p>
-            <a:pPr/>
-            <a:r>
-              <a:t>Referências</a:t>
+          <a:lstStyle>
+            <a:lvl1pPr defTabSz="484886">
+              <a:defRPr sz="6640"/>
+            </a:lvl1pPr>
+          </a:lstStyle>
+          <a:p>
+            <a:pPr/>
+            <a:r>
+              <a:t>Estrutura dos componentes em VHDL: DCO</a:t>
             </a:r>
           </a:p>
         </p:txBody>
       </p:sp>
-      <p:sp>
-        <p:nvSpPr>
-          <p:cNvPr id="326" name="Behzad Razavi, &quot;Design of Monolithic PhaseLocked Loops and Clock Recovery CircuitsA Tutorial,&quot; in Monolithic Phase-Locked Loops and Clock Recovery Circuits: Theory and Design , IEEE, 1996, pp.1-39, doi: 10.1109/9780470545331.ch1.…"/>
-          <p:cNvSpPr txBox="1"/>
-          <p:nvPr>
-            <p:ph type="body" idx="1"/>
-          </p:nvPr>
-        </p:nvSpPr>
-        <p:spPr>
-          <a:prstGeom prst="rect">
-            <a:avLst/>
-          </a:prstGeom>
-        </p:spPr>
-        <p:txBody>
-          <a:bodyPr/>
-          <a:lstStyle/>
-          <a:p>
-            <a:pPr marL="342900" indent="-342900" defTabSz="315468">
-              <a:spcBef>
-                <a:spcPts val="2200"/>
-              </a:spcBef>
-              <a:buSzPct val="100000"/>
-              <a:buAutoNum type="arabicParenBoth" startAt="1"/>
-              <a:defRPr sz="1728"/>
-            </a:pPr>
-            <a:r>
-              <a:t>Behzad Razavi, "Design of Monolithic PhaseLocked Loops and Clock Recovery CircuitsA Tutorial," in Monolithic Phase-Locked Loops and Clock Recovery Circuits: Theory and Design , IEEE, 1996, pp.1-39, doi: 10.1109/9780470545331.ch1.</a:t>
-            </a:r>
-          </a:p>
-          <a:p>
-            <a:pPr marL="342900" indent="-342900" defTabSz="315468">
-              <a:spcBef>
-                <a:spcPts val="2200"/>
-              </a:spcBef>
-              <a:buSzPct val="100000"/>
-              <a:buAutoNum type="arabicParenBoth" startAt="1"/>
-              <a:defRPr sz="1728"/>
-            </a:pPr>
-            <a:r>
-              <a:t>E. Zianbetov, M. Javidan, F. Anceau and D. Galayko, E. Colinet, J. Juillard. Design and VHDL Modeling of All-Digital PLLs. 8th IEEE International NEWCAS Conference (NEWCAS’10), Montreal: Canada (2010).</a:t>
-            </a:r>
-          </a:p>
-          <a:p>
-            <a:pPr marL="342900" indent="-342900" defTabSz="315468">
-              <a:spcBef>
-                <a:spcPts val="2200"/>
-              </a:spcBef>
-              <a:buSzPct val="100000"/>
-              <a:buAutoNum type="arabicParenBoth" startAt="1"/>
-              <a:defRPr sz="1728"/>
-            </a:pPr>
-            <a:r>
-              <a:t>K. Lata, M. Kumar. ADPLL Design and Implementation on FPGA. International Conference on Intelligent Systems and Signal Processing (ISSP), IEEE, 2013.</a:t>
-            </a:r>
-          </a:p>
-          <a:p>
-            <a:pPr marL="342900" indent="-342900" defTabSz="315468">
-              <a:spcBef>
-                <a:spcPts val="2200"/>
-              </a:spcBef>
-              <a:buSzPct val="100000"/>
-              <a:buAutoNum type="arabicParenBoth" startAt="1"/>
-              <a:defRPr sz="1728"/>
-            </a:pPr>
-            <a:r>
-              <a:t>Gayathri M G. Design of All Digital Phase Locked Loop in VHDL. International Journal of Engineering Research and Applications (IJERA), Vol. 3, Issue 4, 2013, pp. 1074-1076.</a:t>
-            </a:r>
-          </a:p>
-          <a:p>
-            <a:pPr marL="342900" indent="-342900" defTabSz="315468">
-              <a:spcBef>
-                <a:spcPts val="2200"/>
-              </a:spcBef>
-              <a:buSzPct val="100000"/>
-              <a:buAutoNum type="arabicParenBoth" startAt="1"/>
-              <a:defRPr sz="1728"/>
-            </a:pPr>
-            <a:r>
-              <a:t>Henry Young, Alex Tong, Ahmed Allam. Projeto de um DPLL. Disciplina High Level Digital ASIC Design Using CAD (EE552), Departamento de Engenharia Elétrica e de Computadores,  Universidade de Alberta, Canadá, 1999. Acessado em 10/05/2021.</a:t>
-            </a:r>
-          </a:p>
-          <a:p>
-            <a:pPr marL="342900" indent="-342900" defTabSz="315468">
-              <a:spcBef>
-                <a:spcPts val="2200"/>
-              </a:spcBef>
-              <a:buSzPct val="100000"/>
-              <a:buAutoNum type="arabicParenBoth" startAt="1"/>
-              <a:defRPr sz="1728"/>
-            </a:pPr>
-            <a:r>
-              <a:t>P. E. Allen. Lecture 080 - All Digital Phase Lock Loops (ADPLL). Material da disciplina </a:t>
-            </a:r>
-            <a:r>
-              <a:rPr i="1"/>
-              <a:t>Frequency Sythesizers</a:t>
-            </a:r>
-            <a:r>
-              <a:t>, The School of Electrical and Computer Engineering of Georgia Institute of Technology,2003. Acessado em: 02/07/2021.</a:t>
-            </a:r>
-          </a:p>
-          <a:p>
-            <a:pPr marL="342900" indent="-342900" defTabSz="315468">
-              <a:spcBef>
-                <a:spcPts val="2200"/>
-              </a:spcBef>
-              <a:buSzPct val="100000"/>
-              <a:buAutoNum type="arabicParenBoth" startAt="1"/>
-              <a:defRPr sz="1728"/>
-            </a:pPr>
-            <a:r>
-              <a:t>M. Kumar, K. Lata. FPGA Implementation of ADPLL with Ripple Reduction Techniques. International Journal of VLSI design &amp; Communication Systems (VLSICS) Vol.3, No.2, 2012 .</a:t>
-            </a:r>
-          </a:p>
-        </p:txBody>
-      </p:sp>
+      <p:grpSp>
+        <p:nvGrpSpPr>
+          <p:cNvPr id="328" name="Galeria de Imagens"/>
+          <p:cNvGrpSpPr/>
+          <p:nvPr/>
+        </p:nvGrpSpPr>
+        <p:grpSpPr>
+          <a:xfrm>
+            <a:off x="1122660" y="2467322"/>
+            <a:ext cx="11427123" cy="7123411"/>
+            <a:chOff x="0" y="0"/>
+            <a:chExt cx="11427122" cy="7123410"/>
+          </a:xfrm>
+        </p:grpSpPr>
+        <p:pic>
+          <p:nvPicPr>
+            <p:cNvPr id="326" name="Captura de Tela 2021-09-08 às 14.15.42.png" descr="Captura de Tela 2021-09-08 às 14.15.42.png"/>
+            <p:cNvPicPr>
+              <a:picLocks noChangeAspect="1"/>
+            </p:cNvPicPr>
+            <p:nvPr/>
+          </p:nvPicPr>
+          <p:blipFill>
+            <a:blip r:embed="rId2">
+              <a:extLst/>
+            </a:blip>
+            <a:srcRect l="0" t="0" r="0" b="0"/>
+            <a:stretch>
+              <a:fillRect/>
+            </a:stretch>
+          </p:blipFill>
+          <p:spPr>
+            <a:xfrm>
+              <a:off x="2538186" y="0"/>
+              <a:ext cx="6350750" cy="6584678"/>
+            </a:xfrm>
+            <a:prstGeom prst="rect">
+              <a:avLst/>
+            </a:prstGeom>
+            <a:ln w="12700" cap="flat">
+              <a:noFill/>
+              <a:miter lim="400000"/>
+            </a:ln>
+            <a:effectLst/>
+          </p:spPr>
+        </p:pic>
+        <p:sp>
+          <p:nvSpPr>
+            <p:cNvPr id="327" name="Trecho de código do DCO baseado nas propostas de [2],[4] e [6]"/>
+            <p:cNvSpPr/>
+            <p:nvPr/>
+          </p:nvSpPr>
+          <p:spPr>
+            <a:xfrm>
+              <a:off x="0" y="6660877"/>
+              <a:ext cx="11427123" cy="462534"/>
+            </a:xfrm>
+            <a:prstGeom prst="rect">
+              <a:avLst/>
+            </a:prstGeom>
+            <a:noFill/>
+            <a:ln w="12700" cap="flat">
+              <a:noFill/>
+              <a:miter lim="400000"/>
+            </a:ln>
+            <a:effectLst/>
+            <a:extLst>
+              <a:ext uri="{C572A759-6A51-4108-AA02-DFA0A04FC94B}">
+                <ma14:wrappingTextBoxFlag xmlns:ma14="http://schemas.microsoft.com/office/mac/drawingml/2011/main" val="1"/>
+              </a:ext>
+            </a:extLst>
+          </p:spPr>
+          <p:txBody>
+            <a:bodyPr wrap="square" lIns="76200" tIns="76200" rIns="76200" bIns="76200" numCol="1" anchor="t">
+              <a:noAutofit/>
+            </a:bodyPr>
+            <a:lstStyle>
+              <a:lvl1pPr>
+                <a:defRPr sz="2000"/>
+              </a:lvl1pPr>
+            </a:lstStyle>
+            <a:p>
+              <a:pPr/>
+              <a:r>
+                <a:t>Trecho de código do DCO baseado nas propostas de [2],[4] e [6]</a:t>
+              </a:r>
+            </a:p>
+          </p:txBody>
+        </p:sp>
+      </p:grpSp>
     </p:spTree>
   </p:cSld>
   <p:clrMapOvr>
@@ -8704,7 +8677,7 @@
       </p:grpSpPr>
       <p:sp>
         <p:nvSpPr>
-          <p:cNvPr id="328" name="Divisor de Frequência da Entrada"/>
+          <p:cNvPr id="330" name="Simulação dos Circuitos"/>
           <p:cNvSpPr txBox="1"/>
           <p:nvPr>
             <p:ph type="title"/>
@@ -8718,35 +8691,35 @@
         <p:txBody>
           <a:bodyPr/>
           <a:lstStyle>
-            <a:lvl1pPr defTabSz="484886">
-              <a:defRPr sz="6640"/>
+            <a:lvl1pPr defTabSz="560831">
+              <a:defRPr sz="7679"/>
             </a:lvl1pPr>
           </a:lstStyle>
           <a:p>
             <a:pPr/>
             <a:r>
-              <a:t>Divisor de Frequência da Entrada</a:t>
+              <a:t>Simulação dos Circuitos</a:t>
             </a:r>
           </a:p>
         </p:txBody>
       </p:sp>
       <p:grpSp>
         <p:nvGrpSpPr>
-          <p:cNvPr id="331" name="Galeria de Imagens"/>
+          <p:cNvPr id="333" name="Galeria de Imagens"/>
           <p:cNvGrpSpPr/>
           <p:nvPr/>
         </p:nvGrpSpPr>
         <p:grpSpPr>
           <a:xfrm>
-            <a:off x="289669" y="2590800"/>
-            <a:ext cx="11762631" cy="6459439"/>
-            <a:chOff x="0" y="0"/>
-            <a:chExt cx="11762630" cy="6459438"/>
+            <a:off x="270569" y="3390442"/>
+            <a:ext cx="12463662" cy="5963505"/>
+            <a:chOff x="0" y="1361071"/>
+            <a:chExt cx="12463660" cy="5963504"/>
           </a:xfrm>
         </p:grpSpPr>
         <p:pic>
           <p:nvPicPr>
-            <p:cNvPr id="329" name="Captura de Tela 2021-07-05 às 17.53.45.png" descr="Captura de Tela 2021-07-05 às 17.53.45.png"/>
+            <p:cNvPr id="331" name="Captura de Tela 2021-09-07 às 20.36.14.png" descr="Captura de Tela 2021-09-07 às 20.36.14.png"/>
             <p:cNvPicPr>
               <a:picLocks noChangeAspect="1"/>
             </p:cNvPicPr>
@@ -8756,15 +8729,15 @@
             <a:blip r:embed="rId2">
               <a:extLst/>
             </a:blip>
-            <a:srcRect l="0" t="5137" r="0" b="5137"/>
+            <a:srcRect l="0" t="0" r="0" b="0"/>
             <a:stretch>
               <a:fillRect/>
             </a:stretch>
           </p:blipFill>
           <p:spPr>
             <a:xfrm>
-              <a:off x="0" y="0"/>
-              <a:ext cx="11762631" cy="5920707"/>
+              <a:off x="0" y="1361071"/>
+              <a:ext cx="12463661" cy="3746202"/>
             </a:xfrm>
             <a:prstGeom prst="rect">
               <a:avLst/>
@@ -8778,14 +8751,14 @@
         </p:pic>
         <p:sp>
           <p:nvSpPr>
-            <p:cNvPr id="330" name="Divisor de Frequência para 25MHz"/>
+            <p:cNvPr id="332" name="Sinais de entrada do sistemas estão fora de fase, sendo sinal ref 180o defasado em relação ao b_in (que simula o sinal do DCO). Borrow foi ativado para compensar a defasagem."/>
             <p:cNvSpPr/>
             <p:nvPr/>
           </p:nvSpPr>
           <p:spPr>
             <a:xfrm>
-              <a:off x="0" y="5996906"/>
-              <a:ext cx="11762631" cy="462533"/>
+              <a:off x="0" y="6544543"/>
+              <a:ext cx="12463661" cy="780034"/>
             </a:xfrm>
             <a:prstGeom prst="rect">
               <a:avLst/>
@@ -8806,15 +8779,58 @@
             <a:bodyPr wrap="square" lIns="76200" tIns="76200" rIns="76200" bIns="76200" numCol="1" anchor="t">
               <a:noAutofit/>
             </a:bodyPr>
-            <a:lstStyle>
-              <a:lvl1pPr>
+            <a:lstStyle/>
+            <a:p>
+              <a:pPr>
                 <a:defRPr sz="2000"/>
-              </a:lvl1pPr>
-            </a:lstStyle>
-            <a:p>
-              <a:pPr/>
+              </a:pPr>
               <a:r>
-                <a:t>Divisor de Frequência para 25MHz</a:t>
+                <a:t>Sinais de entrada do sistemas estão fora de fase, sendo sinal </a:t>
+              </a:r>
+              <a:r>
+                <a:rPr>
+                  <a:solidFill>
+                    <a:schemeClr val="accent4">
+                      <a:hueOff val="-1081314"/>
+                      <a:satOff val="4338"/>
+                      <a:lumOff val="-8931"/>
+                    </a:schemeClr>
+                  </a:solidFill>
+                </a:rPr>
+                <a:t>ref</a:t>
+              </a:r>
+              <a:r>
+                <a:t> 180o defasado em relação ao </a:t>
+              </a:r>
+              <a:r>
+                <a:rPr>
+                  <a:solidFill>
+                    <a:schemeClr val="accent4">
+                      <a:hueOff val="-1081314"/>
+                      <a:satOff val="4338"/>
+                      <a:lumOff val="-8931"/>
+                    </a:schemeClr>
+                  </a:solidFill>
+                </a:rPr>
+                <a:t>b_in</a:t>
+              </a:r>
+              <a:r>
+                <a:t> (que simula o sinal do DCO). </a:t>
+              </a:r>
+              <a:r>
+                <a:rPr>
+                  <a:solidFill>
+                    <a:schemeClr val="accent4">
+                      <a:hueOff val="-1081314"/>
+                      <a:satOff val="4338"/>
+                      <a:lumOff val="-8931"/>
+                    </a:schemeClr>
+                  </a:solidFill>
+                </a:rPr>
+                <a:t>Borrow</a:t>
+              </a:r>
+              <a:r>
+                <a:t> foi ativado para compensar a defasagem.</a:t>
               </a:r>
             </a:p>
           </p:txBody>
@@ -8928,7 +8944,7 @@
       </p:grpSpPr>
       <p:sp>
         <p:nvSpPr>
-          <p:cNvPr id="333" name="PFD"/>
+          <p:cNvPr id="335" name="Referências"/>
           <p:cNvSpPr txBox="1"/>
           <p:nvPr>
             <p:ph type="title"/>
@@ -8945,447 +8961,14 @@
           <a:p>
             <a:pPr/>
             <a:r>
-              <a:t>PFD</a:t>
-            </a:r>
-          </a:p>
-        </p:txBody>
-      </p:sp>
-      <p:grpSp>
-        <p:nvGrpSpPr>
-          <p:cNvPr id="336" name="Galeria de Imagens"/>
-          <p:cNvGrpSpPr/>
-          <p:nvPr/>
-        </p:nvGrpSpPr>
-        <p:grpSpPr>
-          <a:xfrm>
-            <a:off x="1167705" y="2590800"/>
-            <a:ext cx="10884595" cy="6362700"/>
-            <a:chOff x="0" y="0"/>
-            <a:chExt cx="10884594" cy="6362700"/>
-          </a:xfrm>
-        </p:grpSpPr>
-        <p:pic>
-          <p:nvPicPr>
-            <p:cNvPr id="334" name="Captura de Tela 2021-07-05 às 19.29.51.png" descr="Captura de Tela 2021-07-05 às 19.29.51.png"/>
-            <p:cNvPicPr>
-              <a:picLocks noChangeAspect="1"/>
-            </p:cNvPicPr>
-            <p:nvPr/>
-          </p:nvPicPr>
-          <p:blipFill>
-            <a:blip r:embed="rId2">
-              <a:extLst/>
-            </a:blip>
-            <a:srcRect l="0" t="0" r="0" b="0"/>
-            <a:stretch>
-              <a:fillRect/>
-            </a:stretch>
-          </p:blipFill>
-          <p:spPr>
-            <a:xfrm>
-              <a:off x="1352702" y="0"/>
-              <a:ext cx="8179191" cy="5823968"/>
-            </a:xfrm>
-            <a:prstGeom prst="rect">
-              <a:avLst/>
-            </a:prstGeom>
-            <a:ln w="12700" cap="flat">
-              <a:noFill/>
-              <a:miter lim="400000"/>
-            </a:ln>
-            <a:effectLst/>
-          </p:spPr>
-        </p:pic>
-        <p:sp>
-          <p:nvSpPr>
-            <p:cNvPr id="335" name="REF está adiantado em relação a DIV"/>
-            <p:cNvSpPr/>
-            <p:nvPr/>
-          </p:nvSpPr>
-          <p:spPr>
-            <a:xfrm>
-              <a:off x="0" y="5900167"/>
-              <a:ext cx="10884595" cy="462533"/>
-            </a:xfrm>
-            <a:prstGeom prst="rect">
-              <a:avLst/>
-            </a:prstGeom>
-            <a:noFill/>
-            <a:ln w="12700" cap="flat">
-              <a:noFill/>
-              <a:miter lim="400000"/>
-            </a:ln>
-            <a:effectLst/>
-            <a:extLst>
-              <a:ext uri="{C572A759-6A51-4108-AA02-DFA0A04FC94B}">
-                <ma14:wrappingTextBoxFlag xmlns:ma14="http://schemas.microsoft.com/office/mac/drawingml/2011/main" val="1"/>
-              </a:ext>
-            </a:extLst>
-          </p:spPr>
-          <p:txBody>
-            <a:bodyPr wrap="square" lIns="76200" tIns="76200" rIns="76200" bIns="76200" numCol="1" anchor="t">
-              <a:noAutofit/>
-            </a:bodyPr>
-            <a:lstStyle>
-              <a:lvl1pPr>
-                <a:defRPr sz="2000"/>
-              </a:lvl1pPr>
-            </a:lstStyle>
-            <a:p>
-              <a:pPr/>
-              <a:r>
-                <a:t>REF está adiantado em relação a DIV</a:t>
-              </a:r>
-            </a:p>
-          </p:txBody>
-        </p:sp>
-      </p:grpSp>
-    </p:spTree>
-  </p:cSld>
-  <p:clrMapOvr>
-    <a:masterClrMapping/>
-  </p:clrMapOvr>
-  <p:transition xmlns:p14="http://schemas.microsoft.com/office/powerpoint/2010/main" spd="med" advClick="1"/>
-</p:sld>
-</file>
-
-<file path=ppt/slides/slide41.xml><?xml version="1.0" encoding="utf-8"?>
-<p:sld xmlns:a="http://schemas.openxmlformats.org/drawingml/2006/main" xmlns:r="http://schemas.openxmlformats.org/officeDocument/2006/relationships" xmlns:p="http://schemas.openxmlformats.org/presentationml/2006/main" xmlns:m="http://schemas.openxmlformats.org/officeDocument/2006/math" xmlns:a14="http://schemas.microsoft.com/office/drawing/2010/main" showMasterSp="1" showMasterPhAnim="1">
-  <p:cSld>
-    <p:spTree>
-      <p:nvGrpSpPr>
-        <p:cNvPr id="1" name=""/>
-        <p:cNvGrpSpPr/>
-        <p:nvPr/>
-      </p:nvGrpSpPr>
-      <p:grpSpPr>
-        <a:xfrm>
-          <a:off x="0" y="0"/>
-          <a:ext cx="0" cy="0"/>
-          <a:chOff x="0" y="0"/>
-          <a:chExt cx="0" cy="0"/>
-        </a:xfrm>
-      </p:grpSpPr>
-      <p:sp>
-        <p:nvSpPr>
-          <p:cNvPr id="338" name="PFD"/>
-          <p:cNvSpPr txBox="1"/>
-          <p:nvPr>
-            <p:ph type="title"/>
-          </p:nvPr>
-        </p:nvSpPr>
-        <p:spPr>
-          <a:prstGeom prst="rect">
-            <a:avLst/>
-          </a:prstGeom>
-        </p:spPr>
-        <p:txBody>
-          <a:bodyPr/>
-          <a:lstStyle/>
-          <a:p>
-            <a:pPr/>
-            <a:r>
-              <a:t>PFD</a:t>
-            </a:r>
-          </a:p>
-        </p:txBody>
-      </p:sp>
-      <p:grpSp>
-        <p:nvGrpSpPr>
-          <p:cNvPr id="341" name="Galeria de Imagens"/>
-          <p:cNvGrpSpPr/>
-          <p:nvPr/>
-        </p:nvGrpSpPr>
-        <p:grpSpPr>
-          <a:xfrm>
-            <a:off x="-952500" y="2590800"/>
-            <a:ext cx="13004800" cy="6342013"/>
-            <a:chOff x="0" y="0"/>
-            <a:chExt cx="13004800" cy="6342012"/>
-          </a:xfrm>
-        </p:grpSpPr>
-        <p:pic>
-          <p:nvPicPr>
-            <p:cNvPr id="339" name="Captura de Tela 2021-07-05 às 19.36.16.png" descr="Captura de Tela 2021-07-05 às 19.36.16.png"/>
-            <p:cNvPicPr>
-              <a:picLocks noChangeAspect="1"/>
-            </p:cNvPicPr>
-            <p:nvPr/>
-          </p:nvPicPr>
-          <p:blipFill>
-            <a:blip r:embed="rId2">
-              <a:extLst/>
-            </a:blip>
-            <a:srcRect l="0" t="0" r="0" b="0"/>
-            <a:stretch>
-              <a:fillRect/>
-            </a:stretch>
-          </p:blipFill>
-          <p:spPr>
-            <a:xfrm>
-              <a:off x="2930855" y="0"/>
-              <a:ext cx="7143090" cy="5803281"/>
-            </a:xfrm>
-            <a:prstGeom prst="rect">
-              <a:avLst/>
-            </a:prstGeom>
-            <a:ln w="12700" cap="flat">
-              <a:noFill/>
-              <a:miter lim="400000"/>
-            </a:ln>
-            <a:effectLst/>
-          </p:spPr>
-        </p:pic>
-        <p:sp>
-          <p:nvSpPr>
-            <p:cNvPr id="340" name="DIV está adiantado em relação a REF"/>
-            <p:cNvSpPr/>
-            <p:nvPr/>
-          </p:nvSpPr>
-          <p:spPr>
-            <a:xfrm>
-              <a:off x="0" y="5879480"/>
-              <a:ext cx="13004800" cy="462533"/>
-            </a:xfrm>
-            <a:prstGeom prst="rect">
-              <a:avLst/>
-            </a:prstGeom>
-            <a:noFill/>
-            <a:ln w="12700" cap="flat">
-              <a:noFill/>
-              <a:miter lim="400000"/>
-            </a:ln>
-            <a:effectLst/>
-            <a:extLst>
-              <a:ext uri="{C572A759-6A51-4108-AA02-DFA0A04FC94B}">
-                <ma14:wrappingTextBoxFlag xmlns:ma14="http://schemas.microsoft.com/office/mac/drawingml/2011/main" val="1"/>
-              </a:ext>
-            </a:extLst>
-          </p:spPr>
-          <p:txBody>
-            <a:bodyPr wrap="square" lIns="76200" tIns="76200" rIns="76200" bIns="76200" numCol="1" anchor="t">
-              <a:noAutofit/>
-            </a:bodyPr>
-            <a:lstStyle>
-              <a:lvl1pPr>
-                <a:defRPr sz="2000"/>
-              </a:lvl1pPr>
-            </a:lstStyle>
-            <a:p>
-              <a:pPr/>
-              <a:r>
-                <a:t>DIV está adiantado em relação a REF</a:t>
-              </a:r>
-            </a:p>
-          </p:txBody>
-        </p:sp>
-      </p:grpSp>
-    </p:spTree>
-  </p:cSld>
-  <p:clrMapOvr>
-    <a:masterClrMapping/>
-  </p:clrMapOvr>
-  <p:transition xmlns:p14="http://schemas.microsoft.com/office/powerpoint/2010/main" spd="med" advClick="1"/>
-</p:sld>
-</file>
-
-<file path=ppt/slides/slide42.xml><?xml version="1.0" encoding="utf-8"?>
-<p:sld xmlns:a="http://schemas.openxmlformats.org/drawingml/2006/main" xmlns:r="http://schemas.openxmlformats.org/officeDocument/2006/relationships" xmlns:p="http://schemas.openxmlformats.org/presentationml/2006/main" xmlns:m="http://schemas.openxmlformats.org/officeDocument/2006/math" xmlns:a14="http://schemas.microsoft.com/office/drawing/2010/main" showMasterSp="1" showMasterPhAnim="1">
-  <p:cSld>
-    <p:spTree>
-      <p:nvGrpSpPr>
-        <p:cNvPr id="1" name=""/>
-        <p:cNvGrpSpPr/>
-        <p:nvPr/>
-      </p:nvGrpSpPr>
-      <p:grpSpPr>
-        <a:xfrm>
-          <a:off x="0" y="0"/>
-          <a:ext cx="0" cy="0"/>
-          <a:chOff x="0" y="0"/>
-          <a:chExt cx="0" cy="0"/>
-        </a:xfrm>
-      </p:grpSpPr>
-      <p:sp>
-        <p:nvSpPr>
-          <p:cNvPr id="343" name="Bloco do FreqDiv implementado"/>
-          <p:cNvSpPr txBox="1"/>
-          <p:nvPr>
-            <p:ph type="title"/>
-          </p:nvPr>
-        </p:nvSpPr>
-        <p:spPr>
-          <a:prstGeom prst="rect">
-            <a:avLst/>
-          </a:prstGeom>
-        </p:spPr>
-        <p:txBody>
-          <a:bodyPr/>
-          <a:lstStyle>
-            <a:lvl1pPr defTabSz="484886">
-              <a:defRPr sz="6640"/>
-            </a:lvl1pPr>
-          </a:lstStyle>
-          <a:p>
-            <a:pPr/>
-            <a:r>
-              <a:t>Bloco do FreqDiv implementado</a:t>
-            </a:r>
-          </a:p>
-        </p:txBody>
-      </p:sp>
-      <p:grpSp>
-        <p:nvGrpSpPr>
-          <p:cNvPr id="346" name="Galeria de Imagens"/>
-          <p:cNvGrpSpPr/>
-          <p:nvPr/>
-        </p:nvGrpSpPr>
-        <p:grpSpPr>
-          <a:xfrm>
-            <a:off x="907231" y="3595491"/>
-            <a:ext cx="11190338" cy="5358010"/>
-            <a:chOff x="0" y="1004691"/>
-            <a:chExt cx="11190337" cy="5358008"/>
-          </a:xfrm>
-        </p:grpSpPr>
-        <p:pic>
-          <p:nvPicPr>
-            <p:cNvPr id="344" name="Captura de Tela 2021-07-05 às 17.55.57.png" descr="Captura de Tela 2021-07-05 às 17.55.57.png"/>
-            <p:cNvPicPr>
-              <a:picLocks noChangeAspect="1"/>
-            </p:cNvPicPr>
-            <p:nvPr/>
-          </p:nvPicPr>
-          <p:blipFill>
-            <a:blip r:embed="rId2">
-              <a:extLst/>
-            </a:blip>
-            <a:srcRect l="0" t="0" r="0" b="0"/>
-            <a:stretch>
-              <a:fillRect/>
-            </a:stretch>
-          </p:blipFill>
-          <p:spPr>
-            <a:xfrm>
-              <a:off x="0" y="1004691"/>
-              <a:ext cx="11190338" cy="3814586"/>
-            </a:xfrm>
-            <a:prstGeom prst="rect">
-              <a:avLst/>
-            </a:prstGeom>
-            <a:ln w="12700" cap="flat">
-              <a:noFill/>
-              <a:miter lim="400000"/>
-            </a:ln>
-            <a:effectLst/>
-          </p:spPr>
-        </p:pic>
-        <p:sp>
-          <p:nvSpPr>
-            <p:cNvPr id="345" name="Esquema do Divisor Frequência para a Frequência de entrada ref"/>
-            <p:cNvSpPr/>
-            <p:nvPr/>
-          </p:nvSpPr>
-          <p:spPr>
-            <a:xfrm>
-              <a:off x="0" y="5900167"/>
-              <a:ext cx="11190338" cy="462533"/>
-            </a:xfrm>
-            <a:prstGeom prst="rect">
-              <a:avLst/>
-            </a:prstGeom>
-            <a:noFill/>
-            <a:ln w="12700" cap="flat">
-              <a:noFill/>
-              <a:miter lim="400000"/>
-            </a:ln>
-            <a:effectLst/>
-            <a:extLst>
-              <a:ext uri="{C572A759-6A51-4108-AA02-DFA0A04FC94B}">
-                <ma14:wrappingTextBoxFlag xmlns:ma14="http://schemas.microsoft.com/office/mac/drawingml/2011/main" val="1"/>
-              </a:ext>
-            </a:extLst>
-          </p:spPr>
-          <p:txBody>
-            <a:bodyPr wrap="square" lIns="76200" tIns="76200" rIns="76200" bIns="76200" numCol="1" anchor="t">
-              <a:noAutofit/>
-            </a:bodyPr>
-            <a:lstStyle/>
-            <a:p>
-              <a:pPr>
-                <a:defRPr sz="2000"/>
-              </a:pPr>
-              <a:r>
-                <a:t>Esquema do Divisor Frequência para a Frequência de entrada </a:t>
-              </a:r>
-              <a:r>
-                <a:rPr>
-                  <a:solidFill>
-                    <a:schemeClr val="accent1">
-                      <a:hueOff val="114395"/>
-                      <a:lumOff val="-24975"/>
-                    </a:schemeClr>
-                  </a:solidFill>
-                </a:rPr>
-                <a:t>ref</a:t>
-              </a:r>
-            </a:p>
-          </p:txBody>
-        </p:sp>
-      </p:grpSp>
-    </p:spTree>
-  </p:cSld>
-  <p:clrMapOvr>
-    <a:masterClrMapping/>
-  </p:clrMapOvr>
-  <p:transition xmlns:p14="http://schemas.microsoft.com/office/powerpoint/2010/main" spd="med" advClick="1"/>
-</p:sld>
-</file>
-
-<file path=ppt/slides/slide43.xml><?xml version="1.0" encoding="utf-8"?>
-<p:sld xmlns:a="http://schemas.openxmlformats.org/drawingml/2006/main" xmlns:r="http://schemas.openxmlformats.org/officeDocument/2006/relationships" xmlns:p="http://schemas.openxmlformats.org/presentationml/2006/main" xmlns:m="http://schemas.openxmlformats.org/officeDocument/2006/math" xmlns:a14="http://schemas.microsoft.com/office/drawing/2010/main" showMasterSp="1" showMasterPhAnim="1">
-  <p:cSld>
-    <p:spTree>
-      <p:nvGrpSpPr>
-        <p:cNvPr id="1" name=""/>
-        <p:cNvGrpSpPr/>
-        <p:nvPr/>
-      </p:nvGrpSpPr>
-      <p:grpSpPr>
-        <a:xfrm>
-          <a:off x="0" y="0"/>
-          <a:ext cx="0" cy="0"/>
-          <a:chOff x="0" y="0"/>
-          <a:chExt cx="0" cy="0"/>
-        </a:xfrm>
-      </p:grpSpPr>
-      <p:sp>
-        <p:nvSpPr>
-          <p:cNvPr id="348" name="Parâmetros do ADPLL"/>
-          <p:cNvSpPr txBox="1"/>
-          <p:nvPr>
-            <p:ph type="title"/>
-          </p:nvPr>
-        </p:nvSpPr>
-        <p:spPr>
-          <a:prstGeom prst="rect">
-            <a:avLst/>
-          </a:prstGeom>
-        </p:spPr>
-        <p:txBody>
-          <a:bodyPr/>
-          <a:lstStyle/>
-          <a:p>
-            <a:pPr/>
-            <a:r>
-              <a:t>Parâmetros do ADPLL</a:t>
+              <a:t>Referências</a:t>
             </a:r>
           </a:p>
         </p:txBody>
       </p:sp>
       <p:sp>
         <p:nvSpPr>
-          <p:cNvPr id="349" name="K, N, kclock, idclock…"/>
+          <p:cNvPr id="336" name="Behzad Razavi, &quot;Design of Monolithic PhaseLocked Loops and Clock Recovery CircuitsA Tutorial,&quot; in Monolithic Phase-Locked Loops and Clock Recovery Circuits: Theory and Design , IEEE, 1996, pp.1-39, doi: 10.1109/9780470545331.ch1.…"/>
           <p:cNvSpPr txBox="1"/>
           <p:nvPr>
             <p:ph type="body" idx="1"/>
@@ -9400,319 +8983,105 @@
           <a:bodyPr/>
           <a:lstStyle/>
           <a:p>
-            <a:pPr marL="311150" indent="-311150" defTabSz="408940">
+            <a:pPr marL="342900" indent="-342900" defTabSz="315468">
               <a:spcBef>
-                <a:spcPts val="2900"/>
+                <a:spcPts val="2200"/>
               </a:spcBef>
-              <a:defRPr sz="2240"/>
+              <a:buSzPct val="100000"/>
+              <a:buAutoNum type="arabicParenBoth" startAt="1"/>
+              <a:defRPr sz="1728"/>
             </a:pPr>
             <a:r>
-              <a:t>K, N, kclock, idclock</a:t>
-            </a:r>
-          </a:p>
-          <a:p>
-            <a:pPr marL="311150" indent="-311150" defTabSz="408940">
+              <a:t>Behzad Razavi, "Design of Monolithic PhaseLocked Loops and Clock Recovery CircuitsA Tutorial," in Monolithic Phase-Locked Loops and Clock Recovery Circuits: Theory and Design , IEEE, 1996, pp.1-39, doi: 10.1109/9780470545331.ch1.</a:t>
+            </a:r>
+          </a:p>
+          <a:p>
+            <a:pPr marL="342900" indent="-342900" defTabSz="315468">
               <a:spcBef>
-                <a:spcPts val="2900"/>
+                <a:spcPts val="2200"/>
               </a:spcBef>
-              <a:defRPr sz="2240"/>
+              <a:buSzPct val="100000"/>
+              <a:buAutoNum type="arabicParenBoth" startAt="1"/>
+              <a:defRPr sz="1728"/>
             </a:pPr>
             <a:r>
-              <a:t> fc = 60Hz;</a:t>
-            </a:r>
-          </a:p>
-          <a:p>
-            <a:pPr marL="311150" indent="-311150" defTabSz="408940">
+              <a:t>E. Zianbetov, M. Javidan, F. Anceau and D. Galayko, E. Colinet, J. Juillard. Design and VHDL Modeling of All-Digital PLLs. 8th IEEE International NEWCAS Conference (NEWCAS’10), Montreal: Canada (2010).</a:t>
+            </a:r>
+          </a:p>
+          <a:p>
+            <a:pPr marL="342900" indent="-342900" defTabSz="315468">
               <a:spcBef>
-                <a:spcPts val="2900"/>
+                <a:spcPts val="2200"/>
               </a:spcBef>
-              <a:defRPr sz="2240"/>
+              <a:buSzPct val="100000"/>
+              <a:buAutoNum type="arabicParenBoth" startAt="1"/>
+              <a:defRPr sz="1728"/>
             </a:pPr>
             <a:r>
-              <a:t>kclock = Mfc = 32.60 = 1920Hz</a:t>
-            </a:r>
-          </a:p>
-          <a:p>
-            <a:pPr marL="311150" indent="-311150" defTabSz="408940">
+              <a:t>K. Lata, M. Kumar. ADPLL Design and Implementation on FPGA. International Conference on Intelligent Systems and Signal Processing (ISSP), IEEE, 2013.</a:t>
+            </a:r>
+          </a:p>
+          <a:p>
+            <a:pPr marL="342900" indent="-342900" defTabSz="315468">
               <a:spcBef>
-                <a:spcPts val="2900"/>
+                <a:spcPts val="2200"/>
               </a:spcBef>
-              <a:defRPr sz="2240"/>
+              <a:buSzPct val="100000"/>
+              <a:buAutoNum type="arabicParenBoth" startAt="1"/>
+              <a:defRPr sz="1728"/>
             </a:pPr>
             <a:r>
-              <a:t>idclock = 2Nfc = 2.4.60=480Hz</a:t>
-            </a:r>
-          </a:p>
-          <a:p>
-            <a:pPr marL="311150" indent="-311150" defTabSz="408940">
+              <a:t>Gayathri M G. Design of All Digital Phase Locked Loop in VHDL. International Journal of Engineering Research and Applications (IJERA), Vol. 3, Issue 4, 2013, pp. 1074-1076.</a:t>
+            </a:r>
+          </a:p>
+          <a:p>
+            <a:pPr marL="342900" indent="-342900" defTabSz="315468">
               <a:spcBef>
-                <a:spcPts val="2900"/>
+                <a:spcPts val="2200"/>
               </a:spcBef>
-              <a:defRPr sz="2240"/>
+              <a:buSzPct val="100000"/>
+              <a:buAutoNum type="arabicParenBoth" startAt="1"/>
+              <a:defRPr sz="1728"/>
             </a:pPr>
             <a:r>
-              <a:t>M=2K</a:t>
-            </a:r>
-          </a:p>
-          <a:p>
-            <a:pPr marL="311150" indent="-311150" defTabSz="408940">
+              <a:t>Henry Young, Alex Tong, Ahmed Allam. Projeto de um DPLL. Disciplina High Level Digital ASIC Design Using CAD (EE552), Departamento de Engenharia Elétrica e de Computadores,  Universidade de Alberta, Canadá, 1999. Acessado em 10/05/2021.</a:t>
+            </a:r>
+          </a:p>
+          <a:p>
+            <a:pPr marL="342900" indent="-342900" defTabSz="315468">
               <a:spcBef>
-                <a:spcPts val="2900"/>
+                <a:spcPts val="2200"/>
               </a:spcBef>
-              <a:defRPr sz="2240"/>
+              <a:buSzPct val="100000"/>
+              <a:buAutoNum type="arabicParenBoth" startAt="1"/>
+              <a:defRPr sz="1728"/>
             </a:pPr>
             <a:r>
-              <a:t>Nmin=2M/K</a:t>
-            </a:r>
-          </a:p>
-          <a:p>
-            <a:pPr marL="311150" indent="-311150" defTabSz="408940">
+              <a:t>P. E. Allen. Lecture 080 - All Digital Phase Lock Loops (ADPLL). Material da disciplina </a:t>
+            </a:r>
+            <a:r>
+              <a:rPr i="1"/>
+              <a:t>Frequency Sythesizers</a:t>
+            </a:r>
+            <a:r>
+              <a:t>, The School of Electrical and Computer Engineering of Georgia Institute of Technology,2003. Acessado em: 02/07/2021.</a:t>
+            </a:r>
+          </a:p>
+          <a:p>
+            <a:pPr marL="342900" indent="-342900" defTabSz="315468">
               <a:spcBef>
-                <a:spcPts val="2900"/>
+                <a:spcPts val="2200"/>
               </a:spcBef>
-              <a:defRPr sz="2240"/>
+              <a:buSzPct val="100000"/>
+              <a:buAutoNum type="arabicParenBoth" startAt="1"/>
+              <a:defRPr sz="1728"/>
             </a:pPr>
             <a:r>
-              <a:t>K=16</a:t>
-            </a:r>
-          </a:p>
-          <a:p>
-            <a:pPr marL="311150" indent="-311150" defTabSz="408940">
-              <a:spcBef>
-                <a:spcPts val="2900"/>
-              </a:spcBef>
-              <a:defRPr sz="2240"/>
-            </a:pPr>
-            <a:r>
-              <a:t>M=32</a:t>
-            </a:r>
-          </a:p>
-          <a:p>
-            <a:pPr marL="311150" indent="-311150" defTabSz="408940">
-              <a:spcBef>
-                <a:spcPts val="2900"/>
-              </a:spcBef>
-              <a:defRPr sz="2240"/>
-            </a:pPr>
-            <a:r>
-              <a:t>Nmin=2.32/16= 4</a:t>
+              <a:t>M. Kumar, K. Lata. FPGA Implementation of ADPLL with Ripple Reduction Techniques. International Journal of VLSI design &amp; Communication Systems (VLSICS) Vol.3, No.2, 2012 .</a:t>
             </a:r>
           </a:p>
         </p:txBody>
       </p:sp>
-    </p:spTree>
-  </p:cSld>
-  <p:clrMapOvr>
-    <a:masterClrMapping/>
-  </p:clrMapOvr>
-  <p:transition xmlns:p14="http://schemas.microsoft.com/office/powerpoint/2010/main" spd="med" advClick="1"/>
-</p:sld>
-</file>
-
-<file path=ppt/slides/slide44.xml><?xml version="1.0" encoding="utf-8"?>
-<p:sld xmlns:a="http://schemas.openxmlformats.org/drawingml/2006/main" xmlns:r="http://schemas.openxmlformats.org/officeDocument/2006/relationships" xmlns:p="http://schemas.openxmlformats.org/presentationml/2006/main" xmlns:m="http://schemas.openxmlformats.org/officeDocument/2006/math" xmlns:a14="http://schemas.microsoft.com/office/drawing/2010/main" showMasterSp="1" showMasterPhAnim="1">
-  <p:cSld>
-    <p:spTree>
-      <p:nvGrpSpPr>
-        <p:cNvPr id="1" name=""/>
-        <p:cNvGrpSpPr/>
-        <p:nvPr/>
-      </p:nvGrpSpPr>
-      <p:grpSpPr>
-        <a:xfrm>
-          <a:off x="0" y="0"/>
-          <a:ext cx="0" cy="0"/>
-          <a:chOff x="0" y="0"/>
-          <a:chExt cx="0" cy="0"/>
-        </a:xfrm>
-      </p:grpSpPr>
-      <p:sp>
-        <p:nvSpPr>
-          <p:cNvPr id="351" name="Título"/>
-          <p:cNvSpPr txBox="1"/>
-          <p:nvPr>
-            <p:ph type="title"/>
-          </p:nvPr>
-        </p:nvSpPr>
-        <p:spPr>
-          <a:prstGeom prst="rect">
-            <a:avLst/>
-          </a:prstGeom>
-        </p:spPr>
-        <p:txBody>
-          <a:bodyPr/>
-          <a:lstStyle/>
-          <a:p>
-            <a:pPr defTabSz="484886">
-              <a:defRPr sz="6640"/>
-            </a:pPr>
-          </a:p>
-        </p:txBody>
-      </p:sp>
-      <p:sp>
-        <p:nvSpPr>
-          <p:cNvPr id="352" name="The digital phase locked loop presented in this application note has K= 8, N = 8 and M = 16. This loop was tested with a clock = 25 MHZ. The center frequency is 786 Khz. The lock BW is from 689 Khz to 909 KHz. From 763khz to 806 khz the lock is weak.The lock can be improved by utilizing a ripple cancellation circuit as described in reference [3]. The lock can also be improved by increasing the modulus of the K counter. However, the bandwidth will be reduced."/>
-          <p:cNvSpPr txBox="1"/>
-          <p:nvPr>
-            <p:ph type="body" idx="1"/>
-          </p:nvPr>
-        </p:nvSpPr>
-        <p:spPr>
-          <a:prstGeom prst="rect">
-            <a:avLst/>
-          </a:prstGeom>
-        </p:spPr>
-        <p:txBody>
-          <a:bodyPr/>
-          <a:lstStyle/>
-          <a:p>
-            <a:pPr/>
-            <a:r>
-              <a:t>The digital phase locked loop presented in this application note has K= 8, N = 8 and M = 16. This loop was tested with a clock = 25 MHZ. The center frequency is 786 Khz. The lock BW is from 689 Khz to 909 KHz. From 763khz to 806 khz the lock is weak.The lock can be improved by utilizing a ripple cancellation circuit as described in reference [3]. The lock can also be improved by increasing the modulus of the K counter. However, the bandwidth will be reduced.</a:t>
-            </a:r>
-          </a:p>
-        </p:txBody>
-      </p:sp>
-    </p:spTree>
-  </p:cSld>
-  <p:clrMapOvr>
-    <a:masterClrMapping/>
-  </p:clrMapOvr>
-  <p:transition xmlns:p14="http://schemas.microsoft.com/office/powerpoint/2010/main" spd="med" advClick="1"/>
-</p:sld>
-</file>
-
-<file path=ppt/slides/slide45.xml><?xml version="1.0" encoding="utf-8"?>
-<p:sld xmlns:a="http://schemas.openxmlformats.org/drawingml/2006/main" xmlns:r="http://schemas.openxmlformats.org/officeDocument/2006/relationships" xmlns:p="http://schemas.openxmlformats.org/presentationml/2006/main" xmlns:m="http://schemas.openxmlformats.org/officeDocument/2006/math" xmlns:a14="http://schemas.microsoft.com/office/drawing/2010/main" showMasterSp="1" showMasterPhAnim="1">
-  <p:cSld>
-    <p:spTree>
-      <p:nvGrpSpPr>
-        <p:cNvPr id="1" name=""/>
-        <p:cNvGrpSpPr/>
-        <p:nvPr/>
-      </p:nvGrpSpPr>
-      <p:grpSpPr>
-        <a:xfrm>
-          <a:off x="0" y="0"/>
-          <a:ext cx="0" cy="0"/>
-          <a:chOff x="0" y="0"/>
-          <a:chExt cx="0" cy="0"/>
-        </a:xfrm>
-      </p:grpSpPr>
-      <p:sp>
-        <p:nvSpPr>
-          <p:cNvPr id="354" name="PFD"/>
-          <p:cNvSpPr txBox="1"/>
-          <p:nvPr>
-            <p:ph type="title"/>
-          </p:nvPr>
-        </p:nvSpPr>
-        <p:spPr>
-          <a:prstGeom prst="rect">
-            <a:avLst/>
-          </a:prstGeom>
-        </p:spPr>
-        <p:txBody>
-          <a:bodyPr/>
-          <a:lstStyle/>
-          <a:p>
-            <a:pPr/>
-            <a:r>
-              <a:t>PFD</a:t>
-            </a:r>
-          </a:p>
-        </p:txBody>
-      </p:sp>
-      <p:grpSp>
-        <p:nvGrpSpPr>
-          <p:cNvPr id="357" name="Galeria de Imagens"/>
-          <p:cNvGrpSpPr/>
-          <p:nvPr/>
-        </p:nvGrpSpPr>
-        <p:grpSpPr>
-          <a:xfrm>
-            <a:off x="952500" y="2603500"/>
-            <a:ext cx="11099800" cy="6362700"/>
-            <a:chOff x="0" y="0"/>
-            <a:chExt cx="11099800" cy="6362700"/>
-          </a:xfrm>
-        </p:grpSpPr>
-        <p:pic>
-          <p:nvPicPr>
-            <p:cNvPr id="355" name="Captura de Tela 2021-07-07 às 10.25.18.png" descr="Captura de Tela 2021-07-07 às 10.25.18.png"/>
-            <p:cNvPicPr>
-              <a:picLocks noChangeAspect="1"/>
-            </p:cNvPicPr>
-            <p:nvPr/>
-          </p:nvPicPr>
-          <p:blipFill>
-            <a:blip r:embed="rId2">
-              <a:extLst/>
-            </a:blip>
-            <a:srcRect l="10507" t="0" r="10507" b="0"/>
-            <a:stretch>
-              <a:fillRect/>
-            </a:stretch>
-          </p:blipFill>
-          <p:spPr>
-            <a:xfrm>
-              <a:off x="0" y="0"/>
-              <a:ext cx="11099800" cy="5823968"/>
-            </a:xfrm>
-            <a:prstGeom prst="rect">
-              <a:avLst/>
-            </a:prstGeom>
-            <a:ln w="12700" cap="flat">
-              <a:noFill/>
-              <a:miter lim="400000"/>
-            </a:ln>
-            <a:effectLst/>
-          </p:spPr>
-        </p:pic>
-        <p:sp>
-          <p:nvSpPr>
-            <p:cNvPr id="356" name="Esquema de combinação do Divfreq com o PFD"/>
-            <p:cNvSpPr/>
-            <p:nvPr/>
-          </p:nvSpPr>
-          <p:spPr>
-            <a:xfrm>
-              <a:off x="0" y="5900167"/>
-              <a:ext cx="11099800" cy="462533"/>
-            </a:xfrm>
-            <a:prstGeom prst="rect">
-              <a:avLst/>
-            </a:prstGeom>
-            <a:noFill/>
-            <a:ln w="12700" cap="flat">
-              <a:noFill/>
-              <a:miter lim="400000"/>
-            </a:ln>
-            <a:effectLst/>
-            <a:extLst>
-              <a:ext uri="{C572A759-6A51-4108-AA02-DFA0A04FC94B}">
-                <ma14:wrappingTextBoxFlag xmlns:ma14="http://schemas.microsoft.com/office/mac/drawingml/2011/main" val="1"/>
-              </a:ext>
-            </a:extLst>
-          </p:spPr>
-          <p:txBody>
-            <a:bodyPr wrap="square" lIns="76200" tIns="76200" rIns="76200" bIns="76200" numCol="1" anchor="t">
-              <a:noAutofit/>
-            </a:bodyPr>
-            <a:lstStyle>
-              <a:lvl1pPr>
-                <a:defRPr sz="2000"/>
-              </a:lvl1pPr>
-            </a:lstStyle>
-            <a:p>
-              <a:pPr/>
-              <a:r>
-                <a:t>Esquema de combinação do Divfreq com o PFD</a:t>
-              </a:r>
-            </a:p>
-          </p:txBody>
-        </p:sp>
-      </p:grpSp>
     </p:spTree>
   </p:cSld>
   <p:clrMapOvr>
@@ -10075,8 +9444,8 @@
         </p:nvSpPr>
         <p:spPr>
           <a:xfrm>
-            <a:off x="6132813" y="5408270"/>
-            <a:ext cx="1152754" cy="461060"/>
+            <a:off x="6132812" y="5408270"/>
+            <a:ext cx="1152755" cy="461060"/>
           </a:xfrm>
           <a:prstGeom prst="rect">
             <a:avLst/>
@@ -10167,7 +9536,7 @@
           <p:nvPr/>
         </p:nvCxnSpPr>
         <p:spPr>
-          <a:xfrm>
+          <a:xfrm flipH="1">
             <a:off x="6709189" y="3675988"/>
             <a:ext cx="1" cy="1962812"/>
           </a:xfrm>
@@ -10418,7 +9787,7 @@
         <p:spPr>
           <a:xfrm>
             <a:off x="4345520" y="3820770"/>
-            <a:ext cx="915620" cy="461060"/>
+            <a:ext cx="915621" cy="461060"/>
           </a:xfrm>
           <a:prstGeom prst="rect">
             <a:avLst/>

</xml_diff>

<commit_message>
DCO logic modified and ADPLL tested
</commit_message>
<xml_diff>
--- a/trabalho-pll.pptx
+++ b/trabalho-pll.pptx
@@ -48,6 +48,11 @@
     <p:sldId id="293" r:id="rId45"/>
     <p:sldId id="294" r:id="rId46"/>
     <p:sldId id="295" r:id="rId47"/>
+    <p:sldId id="296" r:id="rId48"/>
+    <p:sldId id="297" r:id="rId49"/>
+    <p:sldId id="298" r:id="rId50"/>
+    <p:sldId id="299" r:id="rId51"/>
+    <p:sldId id="300" r:id="rId52"/>
   </p:sldIdLst>
   <p:sldSz cx="13004800" cy="9753600"/>
   <p:notesSz cx="6858000" cy="9144000"/>
@@ -8711,15 +8716,15 @@
         </p:nvGrpSpPr>
         <p:grpSpPr>
           <a:xfrm>
-            <a:off x="270569" y="3390442"/>
-            <a:ext cx="12463662" cy="5963505"/>
-            <a:chOff x="0" y="1361071"/>
-            <a:chExt cx="12463660" cy="5963504"/>
+            <a:off x="270569" y="3274945"/>
+            <a:ext cx="12463662" cy="6079002"/>
+            <a:chOff x="0" y="1245574"/>
+            <a:chExt cx="12463660" cy="6079001"/>
           </a:xfrm>
         </p:grpSpPr>
         <p:pic>
           <p:nvPicPr>
-            <p:cNvPr id="331" name="Captura de Tela 2021-09-07 às 20.36.14.png" descr="Captura de Tela 2021-09-07 às 20.36.14.png"/>
+            <p:cNvPr id="331" name="Captura de Tela 2021-09-09 às 11.40.23.png" descr="Captura de Tela 2021-09-09 às 11.40.23.png"/>
             <p:cNvPicPr>
               <a:picLocks noChangeAspect="1"/>
             </p:cNvPicPr>
@@ -8729,15 +8734,15 @@
             <a:blip r:embed="rId2">
               <a:extLst/>
             </a:blip>
-            <a:srcRect l="0" t="0" r="0" b="0"/>
+            <a:srcRect l="3173" t="0" r="3173" b="0"/>
             <a:stretch>
               <a:fillRect/>
             </a:stretch>
           </p:blipFill>
           <p:spPr>
             <a:xfrm>
-              <a:off x="0" y="1361071"/>
-              <a:ext cx="12463661" cy="3746202"/>
+              <a:off x="0" y="1245574"/>
+              <a:ext cx="12463661" cy="3977196"/>
             </a:xfrm>
             <a:prstGeom prst="rect">
               <a:avLst/>
@@ -8751,7 +8756,7 @@
         </p:pic>
         <p:sp>
           <p:nvSpPr>
-            <p:cNvPr id="332" name="Sinais de entrada do sistemas estão fora de fase, sendo sinal ref 180o defasado em relação ao b_in (que simula o sinal do DCO). Borrow foi ativado para compensar a defasagem."/>
+            <p:cNvPr id="332" name="Sinais de entrada do sistemas estão fora de fase. A rede está atrasado em relação ao sinal gerado por DCO. Borrow foi ativado para compensar a defasagem."/>
             <p:cNvSpPr/>
             <p:nvPr/>
           </p:nvSpPr>
@@ -8785,37 +8790,7 @@
                 <a:defRPr sz="2000"/>
               </a:pPr>
               <a:r>
-                <a:t>Sinais de entrada do sistemas estão fora de fase, sendo sinal </a:t>
-              </a:r>
-              <a:r>
-                <a:rPr>
-                  <a:solidFill>
-                    <a:schemeClr val="accent4">
-                      <a:hueOff val="-1081314"/>
-                      <a:satOff val="4338"/>
-                      <a:lumOff val="-8931"/>
-                    </a:schemeClr>
-                  </a:solidFill>
-                </a:rPr>
-                <a:t>ref</a:t>
-              </a:r>
-              <a:r>
-                <a:t> 180o defasado em relação ao </a:t>
-              </a:r>
-              <a:r>
-                <a:rPr>
-                  <a:solidFill>
-                    <a:schemeClr val="accent4">
-                      <a:hueOff val="-1081314"/>
-                      <a:satOff val="4338"/>
-                      <a:lumOff val="-8931"/>
-                    </a:schemeClr>
-                  </a:solidFill>
-                </a:rPr>
-                <a:t>b_in</a:t>
-              </a:r>
-              <a:r>
-                <a:t> (que simula o sinal do DCO). </a:t>
+                <a:t>Sinais de entrada do sistemas estão fora de fase. A rede está atrasado em relação ao sinal gerado por DCO. </a:t>
               </a:r>
               <a:r>
                 <a:rPr>
@@ -8944,7 +8919,7 @@
       </p:grpSpPr>
       <p:sp>
         <p:nvSpPr>
-          <p:cNvPr id="335" name="Referências"/>
+          <p:cNvPr id="335" name="Simulação dos Circuitos"/>
           <p:cNvSpPr txBox="1"/>
           <p:nvPr>
             <p:ph type="title"/>
@@ -8957,18 +8932,770 @@
         </p:spPr>
         <p:txBody>
           <a:bodyPr/>
+          <a:lstStyle>
+            <a:lvl1pPr defTabSz="560831">
+              <a:defRPr sz="7679"/>
+            </a:lvl1pPr>
+          </a:lstStyle>
+          <a:p>
+            <a:pPr/>
+            <a:r>
+              <a:t>Simulação dos Circuitos</a:t>
+            </a:r>
+          </a:p>
+        </p:txBody>
+      </p:sp>
+      <p:grpSp>
+        <p:nvGrpSpPr>
+          <p:cNvPr id="338" name="Galeria de Imagens"/>
+          <p:cNvGrpSpPr/>
+          <p:nvPr/>
+        </p:nvGrpSpPr>
+        <p:grpSpPr>
+          <a:xfrm>
+            <a:off x="270569" y="3413005"/>
+            <a:ext cx="12463662" cy="5940942"/>
+            <a:chOff x="0" y="1383635"/>
+            <a:chExt cx="12463660" cy="5940941"/>
+          </a:xfrm>
+        </p:grpSpPr>
+        <p:pic>
+          <p:nvPicPr>
+            <p:cNvPr id="336" name="Captura de Tela 2021-09-09 às 11.51.25.png" descr="Captura de Tela 2021-09-09 às 11.51.25.png"/>
+            <p:cNvPicPr>
+              <a:picLocks noChangeAspect="1"/>
+            </p:cNvPicPr>
+            <p:nvPr/>
+          </p:nvPicPr>
+          <p:blipFill>
+            <a:blip r:embed="rId2">
+              <a:extLst/>
+            </a:blip>
+            <a:srcRect l="0" t="0" r="0" b="0"/>
+            <a:stretch>
+              <a:fillRect/>
+            </a:stretch>
+          </p:blipFill>
+          <p:spPr>
+            <a:xfrm>
+              <a:off x="0" y="1383635"/>
+              <a:ext cx="12463661" cy="3701074"/>
+            </a:xfrm>
+            <a:prstGeom prst="rect">
+              <a:avLst/>
+            </a:prstGeom>
+            <a:ln w="12700" cap="flat">
+              <a:noFill/>
+              <a:miter lim="400000"/>
+            </a:ln>
+            <a:effectLst/>
+          </p:spPr>
+        </p:pic>
+        <p:sp>
+          <p:nvSpPr>
+            <p:cNvPr id="337" name="Sinais de entrada do sistemas estão fora de fase. A rede está adiantada em relação ao sinal de DCO. Carry foi ativado para compensar a defasagem."/>
+            <p:cNvSpPr/>
+            <p:nvPr/>
+          </p:nvSpPr>
+          <p:spPr>
+            <a:xfrm>
+              <a:off x="0" y="6544543"/>
+              <a:ext cx="12463661" cy="780034"/>
+            </a:xfrm>
+            <a:prstGeom prst="rect">
+              <a:avLst/>
+            </a:prstGeom>
+            <a:noFill/>
+            <a:ln w="12700" cap="flat">
+              <a:noFill/>
+              <a:miter lim="400000"/>
+            </a:ln>
+            <a:effectLst/>
+            <a:extLst>
+              <a:ext uri="{C572A759-6A51-4108-AA02-DFA0A04FC94B}">
+                <ma14:wrappingTextBoxFlag xmlns:ma14="http://schemas.microsoft.com/office/mac/drawingml/2011/main" val="1"/>
+              </a:ext>
+            </a:extLst>
+          </p:spPr>
+          <p:txBody>
+            <a:bodyPr wrap="square" lIns="76200" tIns="76200" rIns="76200" bIns="76200" numCol="1" anchor="t">
+              <a:noAutofit/>
+            </a:bodyPr>
+            <a:lstStyle/>
+            <a:p>
+              <a:pPr>
+                <a:defRPr sz="2000"/>
+              </a:pPr>
+              <a:r>
+                <a:t>Sinais de entrada do sistemas estão fora de fase. A rede está adiantada em relação ao sinal de DCO. </a:t>
+              </a:r>
+              <a:r>
+                <a:rPr>
+                  <a:solidFill>
+                    <a:schemeClr val="accent4">
+                      <a:hueOff val="-1081314"/>
+                      <a:satOff val="4338"/>
+                      <a:lumOff val="-8931"/>
+                    </a:schemeClr>
+                  </a:solidFill>
+                </a:rPr>
+                <a:t>Carry</a:t>
+              </a:r>
+              <a:r>
+                <a:t> foi ativado para compensar a defasagem.</a:t>
+              </a:r>
+            </a:p>
+          </p:txBody>
+        </p:sp>
+      </p:grpSp>
+    </p:spTree>
+  </p:cSld>
+  <p:clrMapOvr>
+    <a:masterClrMapping/>
+  </p:clrMapOvr>
+  <p:transition xmlns:p14="http://schemas.microsoft.com/office/powerpoint/2010/main" spd="med" advClick="1"/>
+</p:sld>
+</file>
+
+<file path=ppt/slides/slide41.xml><?xml version="1.0" encoding="utf-8"?>
+<p:sld xmlns:a="http://schemas.openxmlformats.org/drawingml/2006/main" xmlns:r="http://schemas.openxmlformats.org/officeDocument/2006/relationships" xmlns:p="http://schemas.openxmlformats.org/presentationml/2006/main" xmlns:m="http://schemas.openxmlformats.org/officeDocument/2006/math" xmlns:a14="http://schemas.microsoft.com/office/drawing/2010/main" showMasterSp="1" showMasterPhAnim="1">
+  <p:cSld>
+    <p:spTree>
+      <p:nvGrpSpPr>
+        <p:cNvPr id="1" name=""/>
+        <p:cNvGrpSpPr/>
+        <p:nvPr/>
+      </p:nvGrpSpPr>
+      <p:grpSpPr>
+        <a:xfrm>
+          <a:off x="0" y="0"/>
+          <a:ext cx="0" cy="0"/>
+          <a:chOff x="0" y="0"/>
+          <a:chExt cx="0" cy="0"/>
+        </a:xfrm>
+      </p:grpSpPr>
+      <p:sp>
+        <p:nvSpPr>
+          <p:cNvPr id="340" name="Estrutura dos componentes em VHDL: Completo"/>
+          <p:cNvSpPr txBox="1"/>
+          <p:nvPr>
+            <p:ph type="title"/>
+          </p:nvPr>
+        </p:nvSpPr>
+        <p:spPr>
+          <a:prstGeom prst="rect">
+            <a:avLst/>
+          </a:prstGeom>
+        </p:spPr>
+        <p:txBody>
+          <a:bodyPr/>
+          <a:lstStyle>
+            <a:lvl1pPr defTabSz="484886">
+              <a:defRPr sz="6640"/>
+            </a:lvl1pPr>
+          </a:lstStyle>
+          <a:p>
+            <a:pPr/>
+            <a:r>
+              <a:t>Estrutura dos componentes em VHDL: Completo</a:t>
+            </a:r>
+          </a:p>
+        </p:txBody>
+      </p:sp>
+      <p:grpSp>
+        <p:nvGrpSpPr>
+          <p:cNvPr id="343" name="Galeria de Imagens"/>
+          <p:cNvGrpSpPr/>
+          <p:nvPr/>
+        </p:nvGrpSpPr>
+        <p:grpSpPr>
+          <a:xfrm>
+            <a:off x="1122660" y="2467322"/>
+            <a:ext cx="11427123" cy="7123411"/>
+            <a:chOff x="0" y="0"/>
+            <a:chExt cx="11427122" cy="7123410"/>
+          </a:xfrm>
+        </p:grpSpPr>
+        <p:pic>
+          <p:nvPicPr>
+            <p:cNvPr id="341" name="Captura de Tela 2021-09-09 às 12.35.25.png" descr="Captura de Tela 2021-09-09 às 12.35.25.png"/>
+            <p:cNvPicPr>
+              <a:picLocks noChangeAspect="1"/>
+            </p:cNvPicPr>
+            <p:nvPr/>
+          </p:nvPicPr>
+          <p:blipFill>
+            <a:blip r:embed="rId2">
+              <a:extLst/>
+            </a:blip>
+            <a:srcRect l="0" t="0" r="0" b="0"/>
+            <a:stretch>
+              <a:fillRect/>
+            </a:stretch>
+          </p:blipFill>
+          <p:spPr>
+            <a:xfrm>
+              <a:off x="1774900" y="0"/>
+              <a:ext cx="7877323" cy="6584678"/>
+            </a:xfrm>
+            <a:prstGeom prst="rect">
+              <a:avLst/>
+            </a:prstGeom>
+            <a:ln w="12700" cap="flat">
+              <a:noFill/>
+              <a:miter lim="400000"/>
+            </a:ln>
+            <a:effectLst/>
+          </p:spPr>
+        </p:pic>
+        <p:sp>
+          <p:nvSpPr>
+            <p:cNvPr id="342" name="Trecho do código do ADPLL implementado e os sinais de referência da rede."/>
+            <p:cNvSpPr/>
+            <p:nvPr/>
+          </p:nvSpPr>
+          <p:spPr>
+            <a:xfrm>
+              <a:off x="0" y="6660877"/>
+              <a:ext cx="11427123" cy="462534"/>
+            </a:xfrm>
+            <a:prstGeom prst="rect">
+              <a:avLst/>
+            </a:prstGeom>
+            <a:noFill/>
+            <a:ln w="12700" cap="flat">
+              <a:noFill/>
+              <a:miter lim="400000"/>
+            </a:ln>
+            <a:effectLst/>
+            <a:extLst>
+              <a:ext uri="{C572A759-6A51-4108-AA02-DFA0A04FC94B}">
+                <ma14:wrappingTextBoxFlag xmlns:ma14="http://schemas.microsoft.com/office/mac/drawingml/2011/main" val="1"/>
+              </a:ext>
+            </a:extLst>
+          </p:spPr>
+          <p:txBody>
+            <a:bodyPr wrap="square" lIns="76200" tIns="76200" rIns="76200" bIns="76200" numCol="1" anchor="t">
+              <a:noAutofit/>
+            </a:bodyPr>
+            <a:lstStyle>
+              <a:lvl1pPr>
+                <a:defRPr sz="2000"/>
+              </a:lvl1pPr>
+            </a:lstStyle>
+            <a:p>
+              <a:pPr/>
+              <a:r>
+                <a:t>Trecho do código do ADPLL implementado e os sinais de referência da rede.</a:t>
+              </a:r>
+            </a:p>
+          </p:txBody>
+        </p:sp>
+      </p:grpSp>
+    </p:spTree>
+  </p:cSld>
+  <p:clrMapOvr>
+    <a:masterClrMapping/>
+  </p:clrMapOvr>
+  <p:transition xmlns:p14="http://schemas.microsoft.com/office/powerpoint/2010/main" spd="med" advClick="1"/>
+</p:sld>
+</file>
+
+<file path=ppt/slides/slide42.xml><?xml version="1.0" encoding="utf-8"?>
+<p:sld xmlns:a="http://schemas.openxmlformats.org/drawingml/2006/main" xmlns:r="http://schemas.openxmlformats.org/officeDocument/2006/relationships" xmlns:p="http://schemas.openxmlformats.org/presentationml/2006/main" xmlns:m="http://schemas.openxmlformats.org/officeDocument/2006/math" xmlns:a14="http://schemas.microsoft.com/office/drawing/2010/main" showMasterSp="1" showMasterPhAnim="1">
+  <p:cSld>
+    <p:spTree>
+      <p:nvGrpSpPr>
+        <p:cNvPr id="1" name=""/>
+        <p:cNvGrpSpPr/>
+        <p:nvPr/>
+      </p:nvGrpSpPr>
+      <p:grpSpPr>
+        <a:xfrm>
+          <a:off x="0" y="0"/>
+          <a:ext cx="0" cy="0"/>
+          <a:chOff x="0" y="0"/>
+          <a:chExt cx="0" cy="0"/>
+        </a:xfrm>
+      </p:grpSpPr>
+      <p:sp>
+        <p:nvSpPr>
+          <p:cNvPr id="345" name="Simulação dos Circuitos"/>
+          <p:cNvSpPr txBox="1"/>
+          <p:nvPr>
+            <p:ph type="title"/>
+          </p:nvPr>
+        </p:nvSpPr>
+        <p:spPr>
+          <a:prstGeom prst="rect">
+            <a:avLst/>
+          </a:prstGeom>
+        </p:spPr>
+        <p:txBody>
+          <a:bodyPr/>
+          <a:lstStyle>
+            <a:lvl1pPr defTabSz="560831">
+              <a:defRPr sz="7679"/>
+            </a:lvl1pPr>
+          </a:lstStyle>
+          <a:p>
+            <a:pPr/>
+            <a:r>
+              <a:t>Simulação dos Circuitos</a:t>
+            </a:r>
+          </a:p>
+        </p:txBody>
+      </p:sp>
+      <p:grpSp>
+        <p:nvGrpSpPr>
+          <p:cNvPr id="348" name="Galeria de Imagens"/>
+          <p:cNvGrpSpPr/>
+          <p:nvPr/>
+        </p:nvGrpSpPr>
+        <p:grpSpPr>
+          <a:xfrm>
+            <a:off x="270569" y="2698230"/>
+            <a:ext cx="12463662" cy="6973217"/>
+            <a:chOff x="0" y="668860"/>
+            <a:chExt cx="12463660" cy="6973216"/>
+          </a:xfrm>
+        </p:grpSpPr>
+        <p:pic>
+          <p:nvPicPr>
+            <p:cNvPr id="346" name="Captura de Tela 2021-09-09 às 12.37.43.png" descr="Captura de Tela 2021-09-09 às 12.37.43.png"/>
+            <p:cNvPicPr>
+              <a:picLocks noChangeAspect="1"/>
+            </p:cNvPicPr>
+            <p:nvPr/>
+          </p:nvPicPr>
+          <p:blipFill>
+            <a:blip r:embed="rId2">
+              <a:extLst/>
+            </a:blip>
+            <a:srcRect l="0" t="0" r="0" b="0"/>
+            <a:stretch>
+              <a:fillRect/>
+            </a:stretch>
+          </p:blipFill>
+          <p:spPr>
+            <a:xfrm>
+              <a:off x="0" y="668860"/>
+              <a:ext cx="12463661" cy="5130624"/>
+            </a:xfrm>
+            <a:prstGeom prst="rect">
+              <a:avLst/>
+            </a:prstGeom>
+            <a:ln w="12700" cap="flat">
+              <a:noFill/>
+              <a:miter lim="400000"/>
+            </a:ln>
+            <a:effectLst/>
+          </p:spPr>
+        </p:pic>
+        <p:sp>
+          <p:nvSpPr>
+            <p:cNvPr id="347" name="Sinal da rede (link_divfreq_sine) está adiantado em relação ao sinal Fc usado no ADPLL (frequência a ser fornecida pelo ADPLL que sai de adpll_out). O sinal de Carry (link_carr_dco) é mantido até que os dois sinais sejam colocados em fase.  O sinal de Borrow fica em zero."/>
+            <p:cNvSpPr/>
+            <p:nvPr/>
+          </p:nvSpPr>
+          <p:spPr>
+            <a:xfrm>
+              <a:off x="0" y="6544543"/>
+              <a:ext cx="12463661" cy="1097534"/>
+            </a:xfrm>
+            <a:prstGeom prst="rect">
+              <a:avLst/>
+            </a:prstGeom>
+            <a:noFill/>
+            <a:ln w="12700" cap="flat">
+              <a:noFill/>
+              <a:miter lim="400000"/>
+            </a:ln>
+            <a:effectLst/>
+            <a:extLst>
+              <a:ext uri="{C572A759-6A51-4108-AA02-DFA0A04FC94B}">
+                <ma14:wrappingTextBoxFlag xmlns:ma14="http://schemas.microsoft.com/office/mac/drawingml/2011/main" val="1"/>
+              </a:ext>
+            </a:extLst>
+          </p:spPr>
+          <p:txBody>
+            <a:bodyPr wrap="square" lIns="76200" tIns="76200" rIns="76200" bIns="76200" numCol="1" anchor="t">
+              <a:noAutofit/>
+            </a:bodyPr>
+            <a:lstStyle/>
+            <a:p>
+              <a:pPr>
+                <a:defRPr sz="2000"/>
+              </a:pPr>
+              <a:r>
+                <a:t>Sinal da rede (</a:t>
+              </a:r>
+              <a:r>
+                <a:rPr>
+                  <a:solidFill>
+                    <a:schemeClr val="accent4">
+                      <a:hueOff val="-1081314"/>
+                      <a:satOff val="4338"/>
+                      <a:lumOff val="-8931"/>
+                    </a:schemeClr>
+                  </a:solidFill>
+                </a:rPr>
+                <a:t>link_divfreq_sine</a:t>
+              </a:r>
+              <a:r>
+                <a:t>) está adiantado em relação ao sinal </a:t>
+              </a:r>
+              <a:r>
+                <a:rPr>
+                  <a:solidFill>
+                    <a:schemeClr val="accent3">
+                      <a:hueOff val="914337"/>
+                      <a:satOff val="31515"/>
+                      <a:lumOff val="-30790"/>
+                    </a:schemeClr>
+                  </a:solidFill>
+                </a:rPr>
+                <a:t>Fc</a:t>
+              </a:r>
+              <a:r>
+                <a:t> usado no ADPLL (frequência a ser fornecida pelo ADPLL que sai de </a:t>
+              </a:r>
+              <a:r>
+                <a:rPr>
+                  <a:solidFill>
+                    <a:schemeClr val="accent4">
+                      <a:hueOff val="-1081314"/>
+                      <a:satOff val="4338"/>
+                      <a:lumOff val="-8931"/>
+                    </a:schemeClr>
+                  </a:solidFill>
+                </a:rPr>
+                <a:t>adpll_out</a:t>
+              </a:r>
+              <a:r>
+                <a:t>). O sinal de Carry (</a:t>
+              </a:r>
+              <a:r>
+                <a:rPr>
+                  <a:solidFill>
+                    <a:schemeClr val="accent4">
+                      <a:hueOff val="-1081314"/>
+                      <a:satOff val="4338"/>
+                      <a:lumOff val="-8931"/>
+                    </a:schemeClr>
+                  </a:solidFill>
+                </a:rPr>
+                <a:t>link_carr_dco</a:t>
+              </a:r>
+              <a:r>
+                <a:t>) é mantido até que os dois sinais sejam colocados em fase.  O sinal de </a:t>
+              </a:r>
+              <a:r>
+                <a:rPr>
+                  <a:solidFill>
+                    <a:schemeClr val="accent4">
+                      <a:hueOff val="-1081314"/>
+                      <a:satOff val="4338"/>
+                      <a:lumOff val="-8931"/>
+                    </a:schemeClr>
+                  </a:solidFill>
+                </a:rPr>
+                <a:t>Borrow</a:t>
+              </a:r>
+              <a:r>
+                <a:t> fica em zero.</a:t>
+              </a:r>
+            </a:p>
+          </p:txBody>
+        </p:sp>
+      </p:grpSp>
+    </p:spTree>
+  </p:cSld>
+  <p:clrMapOvr>
+    <a:masterClrMapping/>
+  </p:clrMapOvr>
+  <p:transition xmlns:p14="http://schemas.microsoft.com/office/powerpoint/2010/main" spd="med" advClick="1"/>
+</p:sld>
+</file>
+
+<file path=ppt/slides/slide43.xml><?xml version="1.0" encoding="utf-8"?>
+<p:sld xmlns:a="http://schemas.openxmlformats.org/drawingml/2006/main" xmlns:r="http://schemas.openxmlformats.org/officeDocument/2006/relationships" xmlns:p="http://schemas.openxmlformats.org/presentationml/2006/main" xmlns:m="http://schemas.openxmlformats.org/officeDocument/2006/math" xmlns:a14="http://schemas.microsoft.com/office/drawing/2010/main" showMasterSp="1" showMasterPhAnim="1">
+  <p:cSld>
+    <p:spTree>
+      <p:nvGrpSpPr>
+        <p:cNvPr id="1" name=""/>
+        <p:cNvGrpSpPr/>
+        <p:nvPr/>
+      </p:nvGrpSpPr>
+      <p:grpSpPr>
+        <a:xfrm>
+          <a:off x="0" y="0"/>
+          <a:ext cx="0" cy="0"/>
+          <a:chOff x="0" y="0"/>
+          <a:chExt cx="0" cy="0"/>
+        </a:xfrm>
+      </p:grpSpPr>
+      <p:sp>
+        <p:nvSpPr>
+          <p:cNvPr id="350" name="Conclusões"/>
+          <p:cNvSpPr txBox="1"/>
+          <p:nvPr>
+            <p:ph type="title"/>
+          </p:nvPr>
+        </p:nvSpPr>
+        <p:spPr>
+          <a:prstGeom prst="rect">
+            <a:avLst/>
+          </a:prstGeom>
+        </p:spPr>
+        <p:txBody>
+          <a:bodyPr/>
           <a:lstStyle/>
           <a:p>
             <a:pPr/>
             <a:r>
-              <a:t>Referências</a:t>
+              <a:t>Conclusões</a:t>
             </a:r>
           </a:p>
         </p:txBody>
       </p:sp>
       <p:sp>
         <p:nvSpPr>
-          <p:cNvPr id="336" name="Behzad Razavi, &quot;Design of Monolithic PhaseLocked Loops and Clock Recovery CircuitsA Tutorial,&quot; in Monolithic Phase-Locked Loops and Clock Recovery Circuits: Theory and Design , IEEE, 1996, pp.1-39, doi: 10.1109/9780470545331.ch1.…"/>
+          <p:cNvPr id="351" name="A simulação completa do sistema foi realizada usando ondas quadráticas com as frequências desejadas (60Hz e variações próximas)…"/>
+          <p:cNvSpPr txBox="1"/>
+          <p:nvPr>
+            <p:ph type="body" idx="1"/>
+          </p:nvPr>
+        </p:nvSpPr>
+        <p:spPr>
+          <a:xfrm>
+            <a:off x="952500" y="2590800"/>
+            <a:ext cx="11386096" cy="6286500"/>
+          </a:xfrm>
+          <a:prstGeom prst="rect">
+            <a:avLst/>
+          </a:prstGeom>
+        </p:spPr>
+        <p:txBody>
+          <a:bodyPr/>
+          <a:lstStyle/>
+          <a:p>
+            <a:pPr marL="435609" indent="-435609" defTabSz="572516">
+              <a:spcBef>
+                <a:spcPts val="4100"/>
+              </a:spcBef>
+              <a:defRPr sz="3136"/>
+            </a:pPr>
+            <a:r>
+              <a:t>A simulação completa do sistema foi realizada usando ondas quadráticas com as frequências desejadas (60Hz e variações próximas)</a:t>
+            </a:r>
+          </a:p>
+          <a:p>
+            <a:pPr marL="435609" indent="-435609" defTabSz="572516">
+              <a:spcBef>
+                <a:spcPts val="4100"/>
+              </a:spcBef>
+              <a:defRPr sz="3136"/>
+            </a:pPr>
+            <a:r>
+              <a:t>O comportamento geral do sistema foi aceitável, embora o Dirty Cicle do sinal de saída do ADPLL (</a:t>
+            </a:r>
+            <a:r>
+              <a:rPr b="1">
+                <a:solidFill>
+                  <a:schemeClr val="accent4">
+                    <a:hueOff val="-1081314"/>
+                    <a:satOff val="4338"/>
+                    <a:lumOff val="-8931"/>
+                  </a:schemeClr>
+                </a:solidFill>
+              </a:rPr>
+              <a:t>adpll_out</a:t>
+            </a:r>
+            <a:r>
+              <a:t>) não fosse o mesmo da rede (ver slide 42)</a:t>
+            </a:r>
+          </a:p>
+          <a:p>
+            <a:pPr marL="435609" indent="-435609" defTabSz="572516">
+              <a:spcBef>
+                <a:spcPts val="4100"/>
+              </a:spcBef>
+              <a:defRPr sz="3136"/>
+            </a:pPr>
+            <a:r>
+              <a:t>O uso do gerador de seno (</a:t>
+            </a:r>
+            <a:r>
+              <a:rPr b="1">
+                <a:solidFill>
+                  <a:schemeClr val="accent3">
+                    <a:hueOff val="914337"/>
+                    <a:satOff val="31515"/>
+                    <a:lumOff val="-30790"/>
+                  </a:schemeClr>
+                </a:solidFill>
+              </a:rPr>
+              <a:t>SineGen</a:t>
+            </a:r>
+            <a:r>
+              <a:t>) não foi usado entrada de </a:t>
+            </a:r>
+            <a:r>
+              <a:rPr b="1">
+                <a:solidFill>
+                  <a:schemeClr val="accent3">
+                    <a:hueOff val="914337"/>
+                    <a:satOff val="31515"/>
+                    <a:lumOff val="-30790"/>
+                  </a:schemeClr>
+                </a:solidFill>
+              </a:rPr>
+              <a:t>PFD</a:t>
+            </a:r>
+            <a:r>
+              <a:t>, somente uma onda quadrática com a frequência igual a 60Hz que pode ser modificada para 61Hz para e para 59Hz a fim de testar o controle do sinal de saída do ADPLL</a:t>
+            </a:r>
+          </a:p>
+        </p:txBody>
+      </p:sp>
+    </p:spTree>
+  </p:cSld>
+  <p:clrMapOvr>
+    <a:masterClrMapping/>
+  </p:clrMapOvr>
+  <p:transition xmlns:p14="http://schemas.microsoft.com/office/powerpoint/2010/main" spd="med" advClick="1"/>
+</p:sld>
+</file>
+
+<file path=ppt/slides/slide44.xml><?xml version="1.0" encoding="utf-8"?>
+<p:sld xmlns:a="http://schemas.openxmlformats.org/drawingml/2006/main" xmlns:r="http://schemas.openxmlformats.org/officeDocument/2006/relationships" xmlns:p="http://schemas.openxmlformats.org/presentationml/2006/main" xmlns:m="http://schemas.openxmlformats.org/officeDocument/2006/math" xmlns:a14="http://schemas.microsoft.com/office/drawing/2010/main" showMasterSp="1" showMasterPhAnim="1">
+  <p:cSld>
+    <p:spTree>
+      <p:nvGrpSpPr>
+        <p:cNvPr id="1" name=""/>
+        <p:cNvGrpSpPr/>
+        <p:nvPr/>
+      </p:nvGrpSpPr>
+      <p:grpSpPr>
+        <a:xfrm>
+          <a:off x="0" y="0"/>
+          <a:ext cx="0" cy="0"/>
+          <a:chOff x="0" y="0"/>
+          <a:chExt cx="0" cy="0"/>
+        </a:xfrm>
+      </p:grpSpPr>
+      <p:sp>
+        <p:nvSpPr>
+          <p:cNvPr id="353" name="Conclusões"/>
+          <p:cNvSpPr txBox="1"/>
+          <p:nvPr>
+            <p:ph type="title"/>
+          </p:nvPr>
+        </p:nvSpPr>
+        <p:spPr>
+          <a:prstGeom prst="rect">
+            <a:avLst/>
+          </a:prstGeom>
+        </p:spPr>
+        <p:txBody>
+          <a:bodyPr/>
+          <a:lstStyle/>
+          <a:p>
+            <a:pPr/>
+            <a:r>
+              <a:t>Conclusões</a:t>
+            </a:r>
+          </a:p>
+        </p:txBody>
+      </p:sp>
+      <p:sp>
+        <p:nvSpPr>
+          <p:cNvPr id="354" name="As simulações com os geradores de Seno serão realizadas posteriormente para que se possa ter o comportamento completo do sistema, conforme foi requerido pelo professor da disciplina…"/>
+          <p:cNvSpPr txBox="1"/>
+          <p:nvPr>
+            <p:ph type="body" idx="1"/>
+          </p:nvPr>
+        </p:nvSpPr>
+        <p:spPr>
+          <a:xfrm>
+            <a:off x="952500" y="2590800"/>
+            <a:ext cx="11386096" cy="6286500"/>
+          </a:xfrm>
+          <a:prstGeom prst="rect">
+            <a:avLst/>
+          </a:prstGeom>
+        </p:spPr>
+        <p:txBody>
+          <a:bodyPr/>
+          <a:lstStyle/>
+          <a:p>
+            <a:pPr/>
+            <a:r>
+              <a:t>As simulações com os geradores de Seno serão realizadas posteriormente para que se possa ter o comportamento completo do sistema, conforme foi requerido pelo professor da disciplina</a:t>
+            </a:r>
+          </a:p>
+          <a:p>
+            <a:pPr/>
+            <a:r>
+              <a:t>O código do DCO foi refeito e não está diretamente relacionado com a explicação presente nos slides 18,19, 20 e 21. As alterações foram necessárias após a melhor compreensão do funcionamento do sistema como um todo. As alterações serão discutidas em outra apresentação</a:t>
+            </a:r>
+          </a:p>
+        </p:txBody>
+      </p:sp>
+    </p:spTree>
+  </p:cSld>
+  <p:clrMapOvr>
+    <a:masterClrMapping/>
+  </p:clrMapOvr>
+  <p:transition xmlns:p14="http://schemas.microsoft.com/office/powerpoint/2010/main" spd="med" advClick="1"/>
+</p:sld>
+</file>
+
+<file path=ppt/slides/slide45.xml><?xml version="1.0" encoding="utf-8"?>
+<p:sld xmlns:a="http://schemas.openxmlformats.org/drawingml/2006/main" xmlns:r="http://schemas.openxmlformats.org/officeDocument/2006/relationships" xmlns:p="http://schemas.openxmlformats.org/presentationml/2006/main" xmlns:m="http://schemas.openxmlformats.org/officeDocument/2006/math" xmlns:a14="http://schemas.microsoft.com/office/drawing/2010/main" showMasterSp="1" showMasterPhAnim="1">
+  <p:cSld>
+    <p:spTree>
+      <p:nvGrpSpPr>
+        <p:cNvPr id="1" name=""/>
+        <p:cNvGrpSpPr/>
+        <p:nvPr/>
+      </p:nvGrpSpPr>
+      <p:grpSpPr>
+        <a:xfrm>
+          <a:off x="0" y="0"/>
+          <a:ext cx="0" cy="0"/>
+          <a:chOff x="0" y="0"/>
+          <a:chExt cx="0" cy="0"/>
+        </a:xfrm>
+      </p:grpSpPr>
+      <p:sp>
+        <p:nvSpPr>
+          <p:cNvPr id="356" name="Referências"/>
+          <p:cNvSpPr txBox="1"/>
+          <p:nvPr>
+            <p:ph type="title"/>
+          </p:nvPr>
+        </p:nvSpPr>
+        <p:spPr>
+          <a:prstGeom prst="rect">
+            <a:avLst/>
+          </a:prstGeom>
+        </p:spPr>
+        <p:txBody>
+          <a:bodyPr/>
+          <a:lstStyle/>
+          <a:p>
+            <a:pPr/>
+            <a:r>
+              <a:t>Referências</a:t>
+            </a:r>
+          </a:p>
+        </p:txBody>
+      </p:sp>
+      <p:sp>
+        <p:nvSpPr>
+          <p:cNvPr id="357" name="Behzad Razavi, &quot;Design of Monolithic PhaseLocked Loops and Clock Recovery CircuitsA Tutorial,&quot; in Monolithic Phase-Locked Loops and Clock Recovery Circuits: Theory and Design , IEEE, 1996, pp.1-39, doi: 10.1109/9780470545331.ch1.…"/>
           <p:cNvSpPr txBox="1"/>
           <p:nvPr>
             <p:ph type="body" idx="1"/>

</xml_diff>